<commit_message>
Added support for DateOnly to explain TineProviders
</commit_message>
<xml_diff>
--- a/DI.pptx
+++ b/DI.pptx
@@ -23041,7 +23041,18 @@
             </a:r>
           </a:p>
           <a:p>
-            <a:endParaRPr lang="nl-NL" dirty="0"/>
+            <a:r>
+              <a:rPr lang="nl-NL" dirty="0"/>
+              <a:t>Gebruik </a:t>
+            </a:r>
+            <a:r>
+              <a:rPr lang="nl-NL" dirty="0" err="1"/>
+              <a:t>FakeItEasy</a:t>
+            </a:r>
+            <a:r>
+              <a:rPr lang="nl-NL" dirty="0"/>
+              <a:t> alleen waar nodig</a:t>
+            </a:r>
           </a:p>
           <a:p>
             <a:r>
@@ -24404,10 +24415,10 @@
       </p:sp>
       <p:pic>
         <p:nvPicPr>
-          <p:cNvPr id="14" name="Afbeelding 13">
+          <p:cNvPr id="3" name="Afbeelding 2">
             <a:extLst>
               <a:ext uri="{FF2B5EF4-FFF2-40B4-BE49-F238E27FC236}">
-                <a16:creationId xmlns:a16="http://schemas.microsoft.com/office/drawing/2014/main" id="{8F985459-885B-106D-669E-CAD37A731197}"/>
+                <a16:creationId xmlns:a16="http://schemas.microsoft.com/office/drawing/2014/main" id="{F71B85ED-74B6-2235-A211-4D1EEBFB3957}"/>
               </a:ext>
             </a:extLst>
           </p:cNvPr>
@@ -24424,8 +24435,8 @@
         </p:blipFill>
         <p:spPr>
           <a:xfrm>
-            <a:off x="865188" y="1825625"/>
-            <a:ext cx="9451780" cy="4159250"/>
+            <a:off x="864000" y="1825625"/>
+            <a:ext cx="9564435" cy="4191585"/>
           </a:xfrm>
           <a:prstGeom prst="rect">
             <a:avLst/>
@@ -24526,10 +24537,10 @@
       </p:sp>
       <p:pic>
         <p:nvPicPr>
-          <p:cNvPr id="5" name="Afbeelding 4">
+          <p:cNvPr id="3" name="Afbeelding 2">
             <a:extLst>
               <a:ext uri="{FF2B5EF4-FFF2-40B4-BE49-F238E27FC236}">
-                <a16:creationId xmlns:a16="http://schemas.microsoft.com/office/drawing/2014/main" id="{6A450D74-E4EC-742D-EE62-915CBC0B0AE0}"/>
+                <a16:creationId xmlns:a16="http://schemas.microsoft.com/office/drawing/2014/main" id="{CE35A71B-C881-6EFD-05D9-875AB6DF2108}"/>
               </a:ext>
             </a:extLst>
           </p:cNvPr>
@@ -24546,8 +24557,8 @@
         </p:blipFill>
         <p:spPr>
           <a:xfrm>
-            <a:off x="864000" y="1816100"/>
-            <a:ext cx="6564114" cy="4168374"/>
+            <a:off x="865188" y="1838223"/>
+            <a:ext cx="7047843" cy="4168374"/>
           </a:xfrm>
           <a:prstGeom prst="rect">
             <a:avLst/>

</xml_diff>

<commit_message>
Small improvements based on feedback
</commit_message>
<xml_diff>
--- a/DI.pptx
+++ b/DI.pptx
@@ -1998,7 +1998,7 @@
           <a:p>
             <a:fld id="{69EE0E52-9FA9-4B42-B8AF-6D441E01BAE7}" type="datetimeFigureOut">
               <a:rPr lang="nl-NL"/>
-              <a:t>13-1-2025</a:t>
+              <a:t>16-1-2025</a:t>
             </a:fld>
             <a:endParaRPr lang="nl-NL"/>
           </a:p>
@@ -2163,7 +2163,7 @@
           <a:p>
             <a:fld id="{3077C25E-6688-43F9-8010-6219F97B2F0D}" type="datetimeFigureOut">
               <a:rPr lang="nl-NL"/>
-              <a:t>13-1-2025</a:t>
+              <a:t>16-1-2025</a:t>
             </a:fld>
             <a:endParaRPr lang="nl-NL"/>
           </a:p>
@@ -3067,6 +3067,90 @@
   <p:cSld>
     <p:spTree>
       <p:nvGrpSpPr>
+        <p:cNvPr id="1" name=""/>
+        <p:cNvGrpSpPr/>
+        <p:nvPr/>
+      </p:nvGrpSpPr>
+      <p:grpSpPr>
+        <a:xfrm>
+          <a:off x="0" y="0"/>
+          <a:ext cx="0" cy="0"/>
+          <a:chOff x="0" y="0"/>
+          <a:chExt cx="0" cy="0"/>
+        </a:xfrm>
+      </p:grpSpPr>
+      <p:sp>
+        <p:nvSpPr>
+          <p:cNvPr id="2" name="Tijdelijke aanduiding voor dia-afbeelding 1"/>
+          <p:cNvSpPr>
+            <a:spLocks noGrp="1" noRot="1" noChangeAspect="1"/>
+          </p:cNvSpPr>
+          <p:nvPr>
+            <p:ph type="sldImg"/>
+          </p:nvPr>
+        </p:nvSpPr>
+        <p:spPr/>
+      </p:sp>
+      <p:sp>
+        <p:nvSpPr>
+          <p:cNvPr id="3" name="Tijdelijke aanduiding voor notities 2"/>
+          <p:cNvSpPr>
+            <a:spLocks noGrp="1"/>
+          </p:cNvSpPr>
+          <p:nvPr>
+            <p:ph type="body" idx="1"/>
+          </p:nvPr>
+        </p:nvSpPr>
+        <p:spPr/>
+        <p:txBody>
+          <a:bodyPr/>
+          <a:lstStyle/>
+          <a:p>
+            <a:endParaRPr lang="nl-NL" dirty="0"/>
+          </a:p>
+        </p:txBody>
+      </p:sp>
+      <p:sp>
+        <p:nvSpPr>
+          <p:cNvPr id="4" name="Tijdelijke aanduiding voor dianummer 3"/>
+          <p:cNvSpPr>
+            <a:spLocks noGrp="1"/>
+          </p:cNvSpPr>
+          <p:nvPr>
+            <p:ph type="sldNum" sz="quarter" idx="5"/>
+          </p:nvPr>
+        </p:nvSpPr>
+        <p:spPr/>
+        <p:txBody>
+          <a:bodyPr/>
+          <a:lstStyle/>
+          <a:p>
+            <a:fld id="{36A6CEBA-87D9-4668-ADDB-ADABD8CF91EC}" type="slidenum">
+              <a:rPr lang="nl-NL" smtClean="0"/>
+              <a:t>20</a:t>
+            </a:fld>
+            <a:endParaRPr lang="nl-NL"/>
+          </a:p>
+        </p:txBody>
+      </p:sp>
+    </p:spTree>
+    <p:extLst>
+      <p:ext uri="{BB962C8B-B14F-4D97-AF65-F5344CB8AC3E}">
+        <p14:creationId xmlns:p14="http://schemas.microsoft.com/office/powerpoint/2010/main" val="3900390225"/>
+      </p:ext>
+    </p:extLst>
+  </p:cSld>
+  <p:clrMapOvr>
+    <a:masterClrMapping/>
+  </p:clrMapOvr>
+</p:notes>
+</file>
+
+<file path=ppt/notesSlides/notesSlide16.xml><?xml version="1.0" encoding="utf-8"?>
+<p:notes xmlns:a="http://schemas.openxmlformats.org/drawingml/2006/main" xmlns:r="http://schemas.openxmlformats.org/officeDocument/2006/relationships" xmlns:p="http://schemas.openxmlformats.org/presentationml/2006/main">
+  <p:cSld>
+    <p:spTree>
+      <p:nvGrpSpPr>
         <p:cNvPr id="1" name="">
           <a:extLst>
             <a:ext uri="{FF2B5EF4-FFF2-40B4-BE49-F238E27FC236}">
@@ -3170,7 +3254,7 @@
 </p:notes>
 </file>
 
-<file path=ppt/notesSlides/notesSlide16.xml><?xml version="1.0" encoding="utf-8"?>
+<file path=ppt/notesSlides/notesSlide17.xml><?xml version="1.0" encoding="utf-8"?>
 <p:notes xmlns:a="http://schemas.openxmlformats.org/drawingml/2006/main" xmlns:r="http://schemas.openxmlformats.org/officeDocument/2006/relationships" xmlns:p="http://schemas.openxmlformats.org/presentationml/2006/main">
   <p:cSld>
     <p:spTree>
@@ -3278,7 +3362,7 @@
 </p:notes>
 </file>
 
-<file path=ppt/notesSlides/notesSlide17.xml><?xml version="1.0" encoding="utf-8"?>
+<file path=ppt/notesSlides/notesSlide18.xml><?xml version="1.0" encoding="utf-8"?>
 <p:notes xmlns:a="http://schemas.openxmlformats.org/drawingml/2006/main" xmlns:r="http://schemas.openxmlformats.org/officeDocument/2006/relationships" xmlns:p="http://schemas.openxmlformats.org/presentationml/2006/main">
   <p:cSld>
     <p:spTree>
@@ -3386,7 +3470,7 @@
 </p:notes>
 </file>
 
-<file path=ppt/notesSlides/notesSlide18.xml><?xml version="1.0" encoding="utf-8"?>
+<file path=ppt/notesSlides/notesSlide19.xml><?xml version="1.0" encoding="utf-8"?>
 <p:notes xmlns:a="http://schemas.openxmlformats.org/drawingml/2006/main" xmlns:r="http://schemas.openxmlformats.org/officeDocument/2006/relationships" xmlns:p="http://schemas.openxmlformats.org/presentationml/2006/main">
   <p:cSld>
     <p:spTree>
@@ -3485,114 +3569,6 @@
     <p:extLst>
       <p:ext uri="{BB962C8B-B14F-4D97-AF65-F5344CB8AC3E}">
         <p14:creationId xmlns:p14="http://schemas.microsoft.com/office/powerpoint/2010/main" val="888765944"/>
-      </p:ext>
-    </p:extLst>
-  </p:cSld>
-  <p:clrMapOvr>
-    <a:masterClrMapping/>
-  </p:clrMapOvr>
-</p:notes>
-</file>
-
-<file path=ppt/notesSlides/notesSlide19.xml><?xml version="1.0" encoding="utf-8"?>
-<p:notes xmlns:a="http://schemas.openxmlformats.org/drawingml/2006/main" xmlns:r="http://schemas.openxmlformats.org/officeDocument/2006/relationships" xmlns:p="http://schemas.openxmlformats.org/presentationml/2006/main">
-  <p:cSld>
-    <p:spTree>
-      <p:nvGrpSpPr>
-        <p:cNvPr id="1" name="">
-          <a:extLst>
-            <a:ext uri="{FF2B5EF4-FFF2-40B4-BE49-F238E27FC236}">
-              <a16:creationId xmlns:a16="http://schemas.microsoft.com/office/drawing/2014/main" id="{736F6A46-970B-C4A6-AB7C-EB041A23CA74}"/>
-            </a:ext>
-          </a:extLst>
-        </p:cNvPr>
-        <p:cNvGrpSpPr/>
-        <p:nvPr/>
-      </p:nvGrpSpPr>
-      <p:grpSpPr>
-        <a:xfrm>
-          <a:off x="0" y="0"/>
-          <a:ext cx="0" cy="0"/>
-          <a:chOff x="0" y="0"/>
-          <a:chExt cx="0" cy="0"/>
-        </a:xfrm>
-      </p:grpSpPr>
-      <p:sp>
-        <p:nvSpPr>
-          <p:cNvPr id="2" name="Tijdelijke aanduiding voor dia-afbeelding 1">
-            <a:extLst>
-              <a:ext uri="{FF2B5EF4-FFF2-40B4-BE49-F238E27FC236}">
-                <a16:creationId xmlns:a16="http://schemas.microsoft.com/office/drawing/2014/main" id="{507695EA-019F-D2B3-8C0B-E2F62084B92C}"/>
-              </a:ext>
-            </a:extLst>
-          </p:cNvPr>
-          <p:cNvSpPr>
-            <a:spLocks noGrp="1" noRot="1" noChangeAspect="1"/>
-          </p:cNvSpPr>
-          <p:nvPr>
-            <p:ph type="sldImg"/>
-          </p:nvPr>
-        </p:nvSpPr>
-        <p:spPr/>
-      </p:sp>
-      <p:sp>
-        <p:nvSpPr>
-          <p:cNvPr id="3" name="Tijdelijke aanduiding voor notities 2">
-            <a:extLst>
-              <a:ext uri="{FF2B5EF4-FFF2-40B4-BE49-F238E27FC236}">
-                <a16:creationId xmlns:a16="http://schemas.microsoft.com/office/drawing/2014/main" id="{E3F053B3-8EA9-9917-EC75-DDC31EB74D42}"/>
-              </a:ext>
-            </a:extLst>
-          </p:cNvPr>
-          <p:cNvSpPr>
-            <a:spLocks noGrp="1"/>
-          </p:cNvSpPr>
-          <p:nvPr>
-            <p:ph type="body" idx="1"/>
-          </p:nvPr>
-        </p:nvSpPr>
-        <p:spPr/>
-        <p:txBody>
-          <a:bodyPr/>
-          <a:lstStyle/>
-          <a:p>
-            <a:endParaRPr lang="nl-NL" dirty="0"/>
-          </a:p>
-        </p:txBody>
-      </p:sp>
-      <p:sp>
-        <p:nvSpPr>
-          <p:cNvPr id="4" name="Tijdelijke aanduiding voor dianummer 3">
-            <a:extLst>
-              <a:ext uri="{FF2B5EF4-FFF2-40B4-BE49-F238E27FC236}">
-                <a16:creationId xmlns:a16="http://schemas.microsoft.com/office/drawing/2014/main" id="{33A1DE78-9BD1-3711-A4D0-395A98AA2613}"/>
-              </a:ext>
-            </a:extLst>
-          </p:cNvPr>
-          <p:cNvSpPr>
-            <a:spLocks noGrp="1"/>
-          </p:cNvSpPr>
-          <p:nvPr>
-            <p:ph type="sldNum" sz="quarter" idx="5"/>
-          </p:nvPr>
-        </p:nvSpPr>
-        <p:spPr/>
-        <p:txBody>
-          <a:bodyPr/>
-          <a:lstStyle/>
-          <a:p>
-            <a:fld id="{36A6CEBA-87D9-4668-ADDB-ADABD8CF91EC}" type="slidenum">
-              <a:rPr lang="nl-NL" smtClean="0"/>
-              <a:t>25</a:t>
-            </a:fld>
-            <a:endParaRPr lang="nl-NL"/>
-          </a:p>
-        </p:txBody>
-      </p:sp>
-    </p:spTree>
-    <p:extLst>
-      <p:ext uri="{BB962C8B-B14F-4D97-AF65-F5344CB8AC3E}">
-        <p14:creationId xmlns:p14="http://schemas.microsoft.com/office/powerpoint/2010/main" val="405407026"/>
       </p:ext>
     </p:extLst>
   </p:cSld>
@@ -3677,6 +3653,198 @@
     <p:extLst>
       <p:ext uri="{BB962C8B-B14F-4D97-AF65-F5344CB8AC3E}">
         <p14:creationId xmlns:p14="http://schemas.microsoft.com/office/powerpoint/2010/main" val="1950794727"/>
+      </p:ext>
+    </p:extLst>
+  </p:cSld>
+  <p:clrMapOvr>
+    <a:masterClrMapping/>
+  </p:clrMapOvr>
+</p:notes>
+</file>
+
+<file path=ppt/notesSlides/notesSlide20.xml><?xml version="1.0" encoding="utf-8"?>
+<p:notes xmlns:a="http://schemas.openxmlformats.org/drawingml/2006/main" xmlns:r="http://schemas.openxmlformats.org/officeDocument/2006/relationships" xmlns:p="http://schemas.openxmlformats.org/presentationml/2006/main">
+  <p:cSld>
+    <p:spTree>
+      <p:nvGrpSpPr>
+        <p:cNvPr id="1" name="">
+          <a:extLst>
+            <a:ext uri="{FF2B5EF4-FFF2-40B4-BE49-F238E27FC236}">
+              <a16:creationId xmlns:a16="http://schemas.microsoft.com/office/drawing/2014/main" id="{736F6A46-970B-C4A6-AB7C-EB041A23CA74}"/>
+            </a:ext>
+          </a:extLst>
+        </p:cNvPr>
+        <p:cNvGrpSpPr/>
+        <p:nvPr/>
+      </p:nvGrpSpPr>
+      <p:grpSpPr>
+        <a:xfrm>
+          <a:off x="0" y="0"/>
+          <a:ext cx="0" cy="0"/>
+          <a:chOff x="0" y="0"/>
+          <a:chExt cx="0" cy="0"/>
+        </a:xfrm>
+      </p:grpSpPr>
+      <p:sp>
+        <p:nvSpPr>
+          <p:cNvPr id="2" name="Tijdelijke aanduiding voor dia-afbeelding 1">
+            <a:extLst>
+              <a:ext uri="{FF2B5EF4-FFF2-40B4-BE49-F238E27FC236}">
+                <a16:creationId xmlns:a16="http://schemas.microsoft.com/office/drawing/2014/main" id="{507695EA-019F-D2B3-8C0B-E2F62084B92C}"/>
+              </a:ext>
+            </a:extLst>
+          </p:cNvPr>
+          <p:cNvSpPr>
+            <a:spLocks noGrp="1" noRot="1" noChangeAspect="1"/>
+          </p:cNvSpPr>
+          <p:nvPr>
+            <p:ph type="sldImg"/>
+          </p:nvPr>
+        </p:nvSpPr>
+        <p:spPr/>
+      </p:sp>
+      <p:sp>
+        <p:nvSpPr>
+          <p:cNvPr id="3" name="Tijdelijke aanduiding voor notities 2">
+            <a:extLst>
+              <a:ext uri="{FF2B5EF4-FFF2-40B4-BE49-F238E27FC236}">
+                <a16:creationId xmlns:a16="http://schemas.microsoft.com/office/drawing/2014/main" id="{E3F053B3-8EA9-9917-EC75-DDC31EB74D42}"/>
+              </a:ext>
+            </a:extLst>
+          </p:cNvPr>
+          <p:cNvSpPr>
+            <a:spLocks noGrp="1"/>
+          </p:cNvSpPr>
+          <p:nvPr>
+            <p:ph type="body" idx="1"/>
+          </p:nvPr>
+        </p:nvSpPr>
+        <p:spPr/>
+        <p:txBody>
+          <a:bodyPr/>
+          <a:lstStyle/>
+          <a:p>
+            <a:endParaRPr lang="nl-NL" dirty="0"/>
+          </a:p>
+        </p:txBody>
+      </p:sp>
+      <p:sp>
+        <p:nvSpPr>
+          <p:cNvPr id="4" name="Tijdelijke aanduiding voor dianummer 3">
+            <a:extLst>
+              <a:ext uri="{FF2B5EF4-FFF2-40B4-BE49-F238E27FC236}">
+                <a16:creationId xmlns:a16="http://schemas.microsoft.com/office/drawing/2014/main" id="{33A1DE78-9BD1-3711-A4D0-395A98AA2613}"/>
+              </a:ext>
+            </a:extLst>
+          </p:cNvPr>
+          <p:cNvSpPr>
+            <a:spLocks noGrp="1"/>
+          </p:cNvSpPr>
+          <p:nvPr>
+            <p:ph type="sldNum" sz="quarter" idx="5"/>
+          </p:nvPr>
+        </p:nvSpPr>
+        <p:spPr/>
+        <p:txBody>
+          <a:bodyPr/>
+          <a:lstStyle/>
+          <a:p>
+            <a:fld id="{36A6CEBA-87D9-4668-ADDB-ADABD8CF91EC}" type="slidenum">
+              <a:rPr lang="nl-NL" smtClean="0"/>
+              <a:t>25</a:t>
+            </a:fld>
+            <a:endParaRPr lang="nl-NL"/>
+          </a:p>
+        </p:txBody>
+      </p:sp>
+    </p:spTree>
+    <p:extLst>
+      <p:ext uri="{BB962C8B-B14F-4D97-AF65-F5344CB8AC3E}">
+        <p14:creationId xmlns:p14="http://schemas.microsoft.com/office/powerpoint/2010/main" val="405407026"/>
+      </p:ext>
+    </p:extLst>
+  </p:cSld>
+  <p:clrMapOvr>
+    <a:masterClrMapping/>
+  </p:clrMapOvr>
+</p:notes>
+</file>
+
+<file path=ppt/notesSlides/notesSlide21.xml><?xml version="1.0" encoding="utf-8"?>
+<p:notes xmlns:a="http://schemas.openxmlformats.org/drawingml/2006/main" xmlns:r="http://schemas.openxmlformats.org/officeDocument/2006/relationships" xmlns:p="http://schemas.openxmlformats.org/presentationml/2006/main">
+  <p:cSld>
+    <p:spTree>
+      <p:nvGrpSpPr>
+        <p:cNvPr id="1" name=""/>
+        <p:cNvGrpSpPr/>
+        <p:nvPr/>
+      </p:nvGrpSpPr>
+      <p:grpSpPr>
+        <a:xfrm>
+          <a:off x="0" y="0"/>
+          <a:ext cx="0" cy="0"/>
+          <a:chOff x="0" y="0"/>
+          <a:chExt cx="0" cy="0"/>
+        </a:xfrm>
+      </p:grpSpPr>
+      <p:sp>
+        <p:nvSpPr>
+          <p:cNvPr id="2" name="Tijdelijke aanduiding voor dia-afbeelding 1"/>
+          <p:cNvSpPr>
+            <a:spLocks noGrp="1" noRot="1" noChangeAspect="1"/>
+          </p:cNvSpPr>
+          <p:nvPr>
+            <p:ph type="sldImg"/>
+          </p:nvPr>
+        </p:nvSpPr>
+        <p:spPr/>
+      </p:sp>
+      <p:sp>
+        <p:nvSpPr>
+          <p:cNvPr id="3" name="Tijdelijke aanduiding voor notities 2"/>
+          <p:cNvSpPr>
+            <a:spLocks noGrp="1"/>
+          </p:cNvSpPr>
+          <p:nvPr>
+            <p:ph type="body" idx="1"/>
+          </p:nvPr>
+        </p:nvSpPr>
+        <p:spPr/>
+        <p:txBody>
+          <a:bodyPr/>
+          <a:lstStyle/>
+          <a:p>
+            <a:endParaRPr lang="nl-NL" dirty="0"/>
+          </a:p>
+        </p:txBody>
+      </p:sp>
+      <p:sp>
+        <p:nvSpPr>
+          <p:cNvPr id="4" name="Tijdelijke aanduiding voor dianummer 3"/>
+          <p:cNvSpPr>
+            <a:spLocks noGrp="1"/>
+          </p:cNvSpPr>
+          <p:nvPr>
+            <p:ph type="sldNum" sz="quarter" idx="5"/>
+          </p:nvPr>
+        </p:nvSpPr>
+        <p:spPr/>
+        <p:txBody>
+          <a:bodyPr/>
+          <a:lstStyle/>
+          <a:p>
+            <a:fld id="{36A6CEBA-87D9-4668-ADDB-ADABD8CF91EC}" type="slidenum">
+              <a:rPr lang="nl-NL" smtClean="0"/>
+              <a:t>26</a:t>
+            </a:fld>
+            <a:endParaRPr lang="nl-NL"/>
+          </a:p>
+        </p:txBody>
+      </p:sp>
+    </p:spTree>
+    <p:extLst>
+      <p:ext uri="{BB962C8B-B14F-4D97-AF65-F5344CB8AC3E}">
+        <p14:creationId xmlns:p14="http://schemas.microsoft.com/office/powerpoint/2010/main" val="1078676800"/>
       </p:ext>
     </p:extLst>
   </p:cSld>
@@ -4233,6 +4401,12 @@
             <a:r>
               <a:rPr lang="nl-NL" dirty="0"/>
               <a:t>Essentieel is het om te documenteren of een service parallel safe is (of moet zijn bij een abstract).</a:t>
+            </a:r>
+          </a:p>
+          <a:p>
+            <a:r>
+              <a:rPr lang="nl-NL" dirty="0"/>
+              <a:t>Kan gevalideerd worden: https://learn.microsoft.com/en-us/aspnet/core/fundamentals/host/web-host?view=aspnetcore-9.0#scope-validation</a:t>
             </a:r>
           </a:p>
         </p:txBody>
@@ -16359,13 +16533,13 @@
   <p:clrMapOvr>
     <a:masterClrMapping/>
   </p:clrMapOvr>
-  <mc:AlternateContent xmlns:mc="http://schemas.openxmlformats.org/markup-compatibility/2006">
-    <mc:Choice xmlns:p14="http://schemas.microsoft.com/office/powerpoint/2010/main" Requires="p14">
+  <mc:AlternateContent xmlns:mc="http://schemas.openxmlformats.org/markup-compatibility/2006" xmlns:p14="http://schemas.microsoft.com/office/powerpoint/2010/main">
+    <mc:Choice Requires="p14">
       <p:transition spd="med" p14:dur="700">
         <p:fade/>
       </p:transition>
     </mc:Choice>
-    <mc:Fallback>
+    <mc:Fallback xmlns="">
       <p:transition spd="med">
         <p:fade/>
       </p:transition>
@@ -16824,13 +16998,13 @@
   <p:clrMapOvr>
     <a:masterClrMapping/>
   </p:clrMapOvr>
-  <mc:AlternateContent xmlns:mc="http://schemas.openxmlformats.org/markup-compatibility/2006">
-    <mc:Choice xmlns:p14="http://schemas.microsoft.com/office/powerpoint/2010/main" Requires="p14">
+  <mc:AlternateContent xmlns:mc="http://schemas.openxmlformats.org/markup-compatibility/2006" xmlns:p14="http://schemas.microsoft.com/office/powerpoint/2010/main">
+    <mc:Choice Requires="p14">
       <p:transition spd="med" p14:dur="700">
         <p:fade/>
       </p:transition>
     </mc:Choice>
-    <mc:Fallback>
+    <mc:Fallback xmlns="">
       <p:transition spd="med">
         <p:fade/>
       </p:transition>
@@ -17431,13 +17605,13 @@
   <p:clrMapOvr>
     <a:masterClrMapping/>
   </p:clrMapOvr>
-  <mc:AlternateContent xmlns:mc="http://schemas.openxmlformats.org/markup-compatibility/2006">
-    <mc:Choice xmlns:p14="http://schemas.microsoft.com/office/powerpoint/2010/main" Requires="p14">
+  <mc:AlternateContent xmlns:mc="http://schemas.openxmlformats.org/markup-compatibility/2006" xmlns:p14="http://schemas.microsoft.com/office/powerpoint/2010/main">
+    <mc:Choice Requires="p14">
       <p:transition spd="med" p14:dur="700">
         <p:fade/>
       </p:transition>
     </mc:Choice>
-    <mc:Fallback>
+    <mc:Fallback xmlns="">
       <p:transition spd="med">
         <p:fade/>
       </p:transition>
@@ -18120,13 +18294,13 @@
   <p:clrMapOvr>
     <a:masterClrMapping/>
   </p:clrMapOvr>
-  <mc:AlternateContent xmlns:mc="http://schemas.openxmlformats.org/markup-compatibility/2006">
-    <mc:Choice xmlns:p14="http://schemas.microsoft.com/office/powerpoint/2010/main" Requires="p14">
+  <mc:AlternateContent xmlns:mc="http://schemas.openxmlformats.org/markup-compatibility/2006" xmlns:p14="http://schemas.microsoft.com/office/powerpoint/2010/main">
+    <mc:Choice Requires="p14">
       <p:transition spd="med" p14:dur="700">
         <p:fade/>
       </p:transition>
     </mc:Choice>
-    <mc:Fallback>
+    <mc:Fallback xmlns="">
       <p:transition spd="med">
         <p:fade/>
       </p:transition>
@@ -18274,13 +18448,13 @@
   <p:clrMapOvr>
     <a:masterClrMapping/>
   </p:clrMapOvr>
-  <mc:AlternateContent xmlns:mc="http://schemas.openxmlformats.org/markup-compatibility/2006">
-    <mc:Choice xmlns:p14="http://schemas.microsoft.com/office/powerpoint/2010/main" Requires="p14">
+  <mc:AlternateContent xmlns:mc="http://schemas.openxmlformats.org/markup-compatibility/2006" xmlns:p14="http://schemas.microsoft.com/office/powerpoint/2010/main">
+    <mc:Choice Requires="p14">
       <p:transition spd="med" p14:dur="700">
         <p:fade/>
       </p:transition>
     </mc:Choice>
-    <mc:Fallback>
+    <mc:Fallback xmlns="">
       <p:transition spd="med">
         <p:fade/>
       </p:transition>
@@ -18963,13 +19137,13 @@
   <p:clrMapOvr>
     <a:masterClrMapping/>
   </p:clrMapOvr>
-  <mc:AlternateContent xmlns:mc="http://schemas.openxmlformats.org/markup-compatibility/2006">
-    <mc:Choice xmlns:p14="http://schemas.microsoft.com/office/powerpoint/2010/main" Requires="p14">
+  <mc:AlternateContent xmlns:mc="http://schemas.openxmlformats.org/markup-compatibility/2006" xmlns:p14="http://schemas.microsoft.com/office/powerpoint/2010/main">
+    <mc:Choice Requires="p14">
       <p:transition spd="med" p14:dur="700">
         <p:fade/>
       </p:transition>
     </mc:Choice>
-    <mc:Fallback>
+    <mc:Fallback xmlns="">
       <p:transition spd="med">
         <p:fade/>
       </p:transition>
@@ -19605,13 +19779,13 @@
   <p:clrMapOvr>
     <a:masterClrMapping/>
   </p:clrMapOvr>
-  <mc:AlternateContent xmlns:mc="http://schemas.openxmlformats.org/markup-compatibility/2006">
-    <mc:Choice xmlns:p14="http://schemas.microsoft.com/office/powerpoint/2010/main" Requires="p14">
+  <mc:AlternateContent xmlns:mc="http://schemas.openxmlformats.org/markup-compatibility/2006" xmlns:p14="http://schemas.microsoft.com/office/powerpoint/2010/main">
+    <mc:Choice Requires="p14">
       <p:transition spd="med" p14:dur="700">
         <p:fade/>
       </p:transition>
     </mc:Choice>
-    <mc:Fallback>
+    <mc:Fallback xmlns="">
       <p:transition spd="med">
         <p:fade/>
       </p:transition>
@@ -19893,13 +20067,13 @@
   <p:clrMapOvr>
     <a:masterClrMapping/>
   </p:clrMapOvr>
-  <mc:AlternateContent xmlns:mc="http://schemas.openxmlformats.org/markup-compatibility/2006">
-    <mc:Choice xmlns:p14="http://schemas.microsoft.com/office/powerpoint/2010/main" Requires="p14">
+  <mc:AlternateContent xmlns:mc="http://schemas.openxmlformats.org/markup-compatibility/2006" xmlns:p14="http://schemas.microsoft.com/office/powerpoint/2010/main">
+    <mc:Choice Requires="p14">
       <p:transition spd="med" p14:dur="700">
         <p:fade/>
       </p:transition>
     </mc:Choice>
-    <mc:Fallback>
+    <mc:Fallback xmlns="">
       <p:transition spd="med">
         <p:fade/>
       </p:transition>
@@ -20104,13 +20278,13 @@
   <p:clrMapOvr>
     <a:masterClrMapping/>
   </p:clrMapOvr>
-  <mc:AlternateContent xmlns:mc="http://schemas.openxmlformats.org/markup-compatibility/2006">
-    <mc:Choice xmlns:p14="http://schemas.microsoft.com/office/powerpoint/2010/main" Requires="p14">
+  <mc:AlternateContent xmlns:mc="http://schemas.openxmlformats.org/markup-compatibility/2006" xmlns:p14="http://schemas.microsoft.com/office/powerpoint/2010/main">
+    <mc:Choice Requires="p14">
       <p:transition spd="med" p14:dur="700">
         <p:fade/>
       </p:transition>
     </mc:Choice>
-    <mc:Fallback>
+    <mc:Fallback xmlns="">
       <p:transition spd="med">
         <p:fade/>
       </p:transition>
@@ -20693,13 +20867,13 @@
   <p:clrMapOvr>
     <a:masterClrMapping/>
   </p:clrMapOvr>
-  <mc:AlternateContent xmlns:mc="http://schemas.openxmlformats.org/markup-compatibility/2006">
-    <mc:Choice xmlns:p14="http://schemas.microsoft.com/office/powerpoint/2010/main" Requires="p14">
+  <mc:AlternateContent xmlns:mc="http://schemas.openxmlformats.org/markup-compatibility/2006" xmlns:p14="http://schemas.microsoft.com/office/powerpoint/2010/main">
+    <mc:Choice Requires="p14">
       <p:transition spd="med" p14:dur="700">
         <p:fade/>
       </p:transition>
     </mc:Choice>
-    <mc:Fallback>
+    <mc:Fallback xmlns="">
       <p:transition spd="med">
         <p:fade/>
       </p:transition>
@@ -21335,13 +21509,13 @@
   <p:clrMapOvr>
     <a:masterClrMapping/>
   </p:clrMapOvr>
-  <mc:AlternateContent xmlns:mc="http://schemas.openxmlformats.org/markup-compatibility/2006">
-    <mc:Choice xmlns:p14="http://schemas.microsoft.com/office/powerpoint/2010/main" Requires="p14">
+  <mc:AlternateContent xmlns:mc="http://schemas.openxmlformats.org/markup-compatibility/2006" xmlns:p14="http://schemas.microsoft.com/office/powerpoint/2010/main">
+    <mc:Choice Requires="p14">
       <p:transition spd="med" p14:dur="700">
         <p:fade/>
       </p:transition>
     </mc:Choice>
-    <mc:Fallback>
+    <mc:Fallback xmlns="">
       <p:transition spd="med">
         <p:fade/>
       </p:transition>
@@ -21457,13 +21631,13 @@
   <p:clrMapOvr>
     <a:masterClrMapping/>
   </p:clrMapOvr>
-  <mc:AlternateContent xmlns:mc="http://schemas.openxmlformats.org/markup-compatibility/2006">
-    <mc:Choice xmlns:p14="http://schemas.microsoft.com/office/powerpoint/2010/main" Requires="p14">
+  <mc:AlternateContent xmlns:mc="http://schemas.openxmlformats.org/markup-compatibility/2006" xmlns:p14="http://schemas.microsoft.com/office/powerpoint/2010/main">
+    <mc:Choice Requires="p14">
       <p:transition spd="med" p14:dur="700">
         <p:fade/>
       </p:transition>
     </mc:Choice>
-    <mc:Fallback>
+    <mc:Fallback xmlns="">
       <p:transition spd="med">
         <p:fade/>
       </p:transition>
@@ -21625,7 +21799,7 @@
           <p:nvPr/>
         </p:nvPicPr>
         <p:blipFill>
-          <a:blip r:embed="rId2">
+          <a:blip r:embed="rId3">
             <a:extLst>
               <a:ext uri="{28A0092B-C50C-407E-A947-70E740481C1C}">
                 <a14:useLocalDpi xmlns:a14="http://schemas.microsoft.com/office/drawing/2010/main" val="0"/>
@@ -21667,13 +21841,13 @@
   <p:clrMapOvr>
     <a:masterClrMapping/>
   </p:clrMapOvr>
-  <mc:AlternateContent xmlns:mc="http://schemas.openxmlformats.org/markup-compatibility/2006">
-    <mc:Choice xmlns:p14="http://schemas.microsoft.com/office/powerpoint/2010/main" Requires="p14">
+  <mc:AlternateContent xmlns:mc="http://schemas.openxmlformats.org/markup-compatibility/2006" xmlns:p14="http://schemas.microsoft.com/office/powerpoint/2010/main">
+    <mc:Choice Requires="p14">
       <p:transition spd="med" p14:dur="700">
         <p:fade/>
       </p:transition>
     </mc:Choice>
-    <mc:Fallback>
+    <mc:Fallback xmlns="">
       <p:transition spd="med">
         <p:fade/>
       </p:transition>
@@ -21825,13 +21999,13 @@
   <p:clrMapOvr>
     <a:masterClrMapping/>
   </p:clrMapOvr>
-  <mc:AlternateContent xmlns:mc="http://schemas.openxmlformats.org/markup-compatibility/2006">
-    <mc:Choice xmlns:p14="http://schemas.microsoft.com/office/powerpoint/2010/main" Requires="p14">
+  <mc:AlternateContent xmlns:mc="http://schemas.openxmlformats.org/markup-compatibility/2006" xmlns:p14="http://schemas.microsoft.com/office/powerpoint/2010/main">
+    <mc:Choice Requires="p14">
       <p:transition spd="med" p14:dur="700">
         <p:fade/>
       </p:transition>
     </mc:Choice>
-    <mc:Fallback>
+    <mc:Fallback xmlns="">
       <p:transition spd="med">
         <p:fade/>
       </p:transition>
@@ -22467,13 +22641,13 @@
   <p:clrMapOvr>
     <a:masterClrMapping/>
   </p:clrMapOvr>
-  <mc:AlternateContent xmlns:mc="http://schemas.openxmlformats.org/markup-compatibility/2006">
-    <mc:Choice xmlns:p14="http://schemas.microsoft.com/office/powerpoint/2010/main" Requires="p14">
+  <mc:AlternateContent xmlns:mc="http://schemas.openxmlformats.org/markup-compatibility/2006" xmlns:p14="http://schemas.microsoft.com/office/powerpoint/2010/main">
+    <mc:Choice Requires="p14">
       <p:transition spd="med" p14:dur="700">
         <p:fade/>
       </p:transition>
     </mc:Choice>
-    <mc:Fallback>
+    <mc:Fallback xmlns="">
       <p:transition spd="med">
         <p:fade/>
       </p:transition>
@@ -22722,13 +22896,13 @@
   <p:clrMapOvr>
     <a:masterClrMapping/>
   </p:clrMapOvr>
-  <mc:AlternateContent xmlns:mc="http://schemas.openxmlformats.org/markup-compatibility/2006">
-    <mc:Choice xmlns:p14="http://schemas.microsoft.com/office/powerpoint/2010/main" Requires="p14">
+  <mc:AlternateContent xmlns:mc="http://schemas.openxmlformats.org/markup-compatibility/2006" xmlns:p14="http://schemas.microsoft.com/office/powerpoint/2010/main">
+    <mc:Choice Requires="p14">
       <p:transition spd="med" p14:dur="700">
         <p:fade/>
       </p:transition>
     </mc:Choice>
-    <mc:Fallback>
+    <mc:Fallback xmlns="">
       <p:transition spd="med">
         <p:fade/>
       </p:transition>
@@ -22925,13 +23099,13 @@
   <p:clrMapOvr>
     <a:masterClrMapping/>
   </p:clrMapOvr>
-  <mc:AlternateContent xmlns:mc="http://schemas.openxmlformats.org/markup-compatibility/2006">
-    <mc:Choice xmlns:p14="http://schemas.microsoft.com/office/powerpoint/2010/main" Requires="p14">
+  <mc:AlternateContent xmlns:mc="http://schemas.openxmlformats.org/markup-compatibility/2006" xmlns:p14="http://schemas.microsoft.com/office/powerpoint/2010/main">
+    <mc:Choice Requires="p14">
       <p:transition spd="med" p14:dur="700">
         <p:fade/>
       </p:transition>
     </mc:Choice>
-    <mc:Fallback>
+    <mc:Fallback xmlns="">
       <p:transition spd="med">
         <p:fade/>
       </p:transition>
@@ -23098,13 +23272,13 @@
   <p:clrMapOvr>
     <a:masterClrMapping/>
   </p:clrMapOvr>
-  <mc:AlternateContent xmlns:mc="http://schemas.openxmlformats.org/markup-compatibility/2006">
-    <mc:Choice xmlns:p14="http://schemas.microsoft.com/office/powerpoint/2010/main" Requires="p14">
+  <mc:AlternateContent xmlns:mc="http://schemas.openxmlformats.org/markup-compatibility/2006" xmlns:p14="http://schemas.microsoft.com/office/powerpoint/2010/main">
+    <mc:Choice Requires="p14">
       <p:transition spd="med" p14:dur="700">
         <p:fade/>
       </p:transition>
     </mc:Choice>
-    <mc:Fallback>
+    <mc:Fallback xmlns="">
       <p:transition spd="med">
         <p:fade/>
       </p:transition>
@@ -23147,7 +23321,7 @@
           </p:nvPr>
         </p:nvPicPr>
         <p:blipFill>
-          <a:blip r:embed="rId2">
+          <a:blip r:embed="rId3">
             <a:extLst>
               <a:ext uri="{28A0092B-C50C-407E-A947-70E740481C1C}">
                 <a14:useLocalDpi xmlns:a14="http://schemas.microsoft.com/office/drawing/2010/main" val="0"/>
@@ -23184,7 +23358,7 @@
           <a:p>
             <a:r>
               <a:rPr lang="nl-NL" dirty="0"/>
-              <a:t>https://github.com/desdesdes/CoreDiDemo</a:t>
+              <a:t>https://github.com/desdesdes/effectief-coredi</a:t>
             </a:r>
           </a:p>
         </p:txBody>
@@ -23199,13 +23373,13 @@
   <p:clrMapOvr>
     <a:masterClrMapping/>
   </p:clrMapOvr>
-  <mc:AlternateContent xmlns:mc="http://schemas.openxmlformats.org/markup-compatibility/2006">
-    <mc:Choice xmlns:p14="http://schemas.microsoft.com/office/powerpoint/2010/main" Requires="p14">
+  <mc:AlternateContent xmlns:mc="http://schemas.openxmlformats.org/markup-compatibility/2006" xmlns:p14="http://schemas.microsoft.com/office/powerpoint/2010/main">
+    <mc:Choice Requires="p14">
       <p:transition spd="med" p14:dur="700">
         <p:fade/>
       </p:transition>
     </mc:Choice>
-    <mc:Fallback>
+    <mc:Fallback xmlns="">
       <p:transition spd="med">
         <p:fade/>
       </p:transition>
@@ -23332,13 +23506,13 @@
   <p:clrMapOvr>
     <a:masterClrMapping/>
   </p:clrMapOvr>
-  <mc:AlternateContent xmlns:mc="http://schemas.openxmlformats.org/markup-compatibility/2006">
-    <mc:Choice xmlns:p14="http://schemas.microsoft.com/office/powerpoint/2010/main" Requires="p14">
+  <mc:AlternateContent xmlns:mc="http://schemas.openxmlformats.org/markup-compatibility/2006" xmlns:p14="http://schemas.microsoft.com/office/powerpoint/2010/main">
+    <mc:Choice Requires="p14">
       <p:transition spd="med" p14:dur="700">
         <p:fade/>
       </p:transition>
     </mc:Choice>
-    <mc:Fallback>
+    <mc:Fallback xmlns="">
       <p:transition spd="med">
         <p:fade/>
       </p:transition>
@@ -23974,13 +24148,13 @@
   <p:clrMapOvr>
     <a:masterClrMapping/>
   </p:clrMapOvr>
-  <mc:AlternateContent xmlns:mc="http://schemas.openxmlformats.org/markup-compatibility/2006">
-    <mc:Choice xmlns:p14="http://schemas.microsoft.com/office/powerpoint/2010/main" Requires="p14">
+  <mc:AlternateContent xmlns:mc="http://schemas.openxmlformats.org/markup-compatibility/2006" xmlns:p14="http://schemas.microsoft.com/office/powerpoint/2010/main">
+    <mc:Choice Requires="p14">
       <p:transition spd="med" p14:dur="700">
         <p:fade/>
       </p:transition>
     </mc:Choice>
-    <mc:Fallback>
+    <mc:Fallback xmlns="">
       <p:transition spd="med">
         <p:fade/>
       </p:transition>
@@ -24172,13 +24346,13 @@
   <p:clrMapOvr>
     <a:masterClrMapping/>
   </p:clrMapOvr>
-  <mc:AlternateContent xmlns:mc="http://schemas.openxmlformats.org/markup-compatibility/2006">
-    <mc:Choice xmlns:p14="http://schemas.microsoft.com/office/powerpoint/2010/main" Requires="p14">
+  <mc:AlternateContent xmlns:mc="http://schemas.openxmlformats.org/markup-compatibility/2006" xmlns:p14="http://schemas.microsoft.com/office/powerpoint/2010/main">
+    <mc:Choice Requires="p14">
       <p:transition spd="med" p14:dur="700">
         <p:fade/>
       </p:transition>
     </mc:Choice>
-    <mc:Fallback>
+    <mc:Fallback xmlns="">
       <p:transition spd="med">
         <p:fade/>
       </p:transition>
@@ -24300,13 +24474,13 @@
   <p:clrMapOvr>
     <a:masterClrMapping/>
   </p:clrMapOvr>
-  <mc:AlternateContent xmlns:mc="http://schemas.openxmlformats.org/markup-compatibility/2006">
-    <mc:Choice xmlns:p14="http://schemas.microsoft.com/office/powerpoint/2010/main" Requires="p14">
+  <mc:AlternateContent xmlns:mc="http://schemas.openxmlformats.org/markup-compatibility/2006" xmlns:p14="http://schemas.microsoft.com/office/powerpoint/2010/main">
+    <mc:Choice Requires="p14">
       <p:transition spd="med" p14:dur="700">
         <p:fade/>
       </p:transition>
     </mc:Choice>
-    <mc:Fallback>
+    <mc:Fallback xmlns="">
       <p:transition spd="med">
         <p:fade/>
       </p:transition>
@@ -24434,13 +24608,13 @@
   <p:clrMapOvr>
     <a:masterClrMapping/>
   </p:clrMapOvr>
-  <mc:AlternateContent xmlns:mc="http://schemas.openxmlformats.org/markup-compatibility/2006">
-    <mc:Choice xmlns:p14="http://schemas.microsoft.com/office/powerpoint/2010/main" Requires="p14">
+  <mc:AlternateContent xmlns:mc="http://schemas.openxmlformats.org/markup-compatibility/2006" xmlns:p14="http://schemas.microsoft.com/office/powerpoint/2010/main">
+    <mc:Choice Requires="p14">
       <p:transition spd="med" p14:dur="700">
         <p:fade/>
       </p:transition>
     </mc:Choice>
-    <mc:Fallback>
+    <mc:Fallback xmlns="">
       <p:transition spd="med">
         <p:fade/>
       </p:transition>
@@ -24655,13 +24829,13 @@
   <p:clrMapOvr>
     <a:masterClrMapping/>
   </p:clrMapOvr>
-  <mc:AlternateContent xmlns:mc="http://schemas.openxmlformats.org/markup-compatibility/2006">
-    <mc:Choice xmlns:p14="http://schemas.microsoft.com/office/powerpoint/2010/main" Requires="p14">
+  <mc:AlternateContent xmlns:mc="http://schemas.openxmlformats.org/markup-compatibility/2006" xmlns:p14="http://schemas.microsoft.com/office/powerpoint/2010/main">
+    <mc:Choice Requires="p14">
       <p:transition spd="med" p14:dur="700">
         <p:fade/>
       </p:transition>
     </mc:Choice>
-    <mc:Fallback>
+    <mc:Fallback xmlns="">
       <p:transition spd="med">
         <p:fade/>
       </p:transition>
@@ -24971,13 +25145,13 @@
   <p:clrMapOvr>
     <a:masterClrMapping/>
   </p:clrMapOvr>
-  <mc:AlternateContent xmlns:mc="http://schemas.openxmlformats.org/markup-compatibility/2006">
-    <mc:Choice xmlns:p14="http://schemas.microsoft.com/office/powerpoint/2010/main" Requires="p14">
+  <mc:AlternateContent xmlns:mc="http://schemas.openxmlformats.org/markup-compatibility/2006" xmlns:p14="http://schemas.microsoft.com/office/powerpoint/2010/main">
+    <mc:Choice Requires="p14">
       <p:transition spd="med" p14:dur="700">
         <p:fade/>
       </p:transition>
     </mc:Choice>
-    <mc:Fallback>
+    <mc:Fallback xmlns="">
       <p:transition spd="med">
         <p:fade/>
       </p:transition>
@@ -25179,13 +25353,13 @@
   <p:clrMapOvr>
     <a:masterClrMapping/>
   </p:clrMapOvr>
-  <mc:AlternateContent xmlns:mc="http://schemas.openxmlformats.org/markup-compatibility/2006">
-    <mc:Choice xmlns:p14="http://schemas.microsoft.com/office/powerpoint/2010/main" Requires="p14">
+  <mc:AlternateContent xmlns:mc="http://schemas.openxmlformats.org/markup-compatibility/2006" xmlns:p14="http://schemas.microsoft.com/office/powerpoint/2010/main">
+    <mc:Choice Requires="p14">
       <p:transition spd="med" p14:dur="700">
         <p:fade/>
       </p:transition>
     </mc:Choice>
-    <mc:Fallback>
+    <mc:Fallback xmlns="">
       <p:transition spd="med">
         <p:fade/>
       </p:transition>

</xml_diff>